<commit_message>
oprava cest v invoice detail
</commit_message>
<xml_diff>
--- a/Documentation/final-presentation.pptx
+++ b/Documentation/final-presentation.pptx
@@ -113,6 +113,11 @@
       </a:defRPr>
     </a:lvl9pPr>
   </p:defaultTextStyle>
+  <p:extLst>
+    <p:ext uri="{EFAFB233-063F-42B5-8137-9DF3F51BA10A}">
+      <p15:sldGuideLst xmlns:p15="http://schemas.microsoft.com/office/powerpoint/2012/main"/>
+    </p:ext>
+  </p:extLst>
 </p:presentation>
 </file>
 
@@ -198,7 +203,7 @@
           <a:p>
             <a:fld id="{EBA5EA57-640C-4C38-81E4-064955D64A56}" type="datetimeFigureOut">
               <a:rPr lang="cs-CZ" smtClean="0"/>
-              <a:t>4.6.2016</a:t>
+              <a:t>7.6.2016</a:t>
             </a:fld>
             <a:endParaRPr lang="cs-CZ"/>
           </a:p>
@@ -4145,7 +4150,6 @@
               <a:rPr lang="cs-CZ" dirty="0"/>
               <a:t>.</a:t>
             </a:r>
-            <a:endParaRPr lang="cs-CZ" dirty="0"/>
           </a:p>
         </p:txBody>
       </p:sp>
@@ -4451,7 +4455,15 @@
           <a:p>
             <a:r>
               <a:rPr lang="cs-CZ" dirty="0" smtClean="0"/>
-              <a:t>Export faktur do PDF</a:t>
+              <a:t>Export faktur do </a:t>
+            </a:r>
+            <a:r>
+              <a:rPr lang="cs-CZ" dirty="0" smtClean="0"/>
+              <a:t>PDF i </a:t>
+            </a:r>
+            <a:r>
+              <a:rPr lang="cs-CZ" dirty="0" err="1" smtClean="0"/>
+              <a:t>DocBook</a:t>
             </a:r>
             <a:endParaRPr lang="cs-CZ" dirty="0"/>
           </a:p>

</xml_diff>